<commit_message>
Updating the presentation slides
</commit_message>
<xml_diff>
--- a/source/ScalarEncoderImproved/Documentation/Improve Scalar Encoder Presentation.pptx
+++ b/source/ScalarEncoderImproved/Documentation/Improve Scalar Encoder Presentation.pptx
@@ -9,7 +9,8 @@
     <p:sldId id="257" r:id="rId3"/>
     <p:sldId id="258" r:id="rId4"/>
     <p:sldId id="259" r:id="rId5"/>
-    <p:sldId id="260" r:id="rId6"/>
+    <p:sldId id="261" r:id="rId6"/>
+    <p:sldId id="260" r:id="rId7"/>
   </p:sldIdLst>
   <p:sldSz cx="12192000" cy="6858000"/>
   <p:notesSz cx="6858000" cy="9144000"/>
@@ -3751,14 +3752,19 @@
             <p:ph type="title"/>
           </p:nvPr>
         </p:nvSpPr>
-        <p:spPr/>
+        <p:spPr>
+          <a:xfrm>
+            <a:off x="764627" y="911663"/>
+            <a:ext cx="10515600" cy="1325563"/>
+          </a:xfrm>
+        </p:spPr>
         <p:txBody>
           <a:bodyPr/>
           <a:lstStyle/>
           <a:p>
             <a:r>
               <a:rPr lang="en-DE" dirty="0"/>
-              <a:t>Improvement in the newer version of Scalar Encoder</a:t>
+              <a:t>Improvement and features in the newer version of Scalar Encoder</a:t>
             </a:r>
           </a:p>
         </p:txBody>
@@ -3779,10 +3785,15 @@
             <p:ph idx="1"/>
           </p:nvPr>
         </p:nvSpPr>
-        <p:spPr/>
+        <p:spPr>
+          <a:xfrm>
+            <a:off x="838200" y="2393184"/>
+            <a:ext cx="10515600" cy="4351338"/>
+          </a:xfrm>
+        </p:spPr>
         <p:txBody>
           <a:bodyPr>
-            <a:normAutofit lnSpcReduction="10000"/>
+            <a:normAutofit/>
           </a:bodyPr>
           <a:lstStyle/>
           <a:p>
@@ -3794,13 +3805,8 @@
           <a:p>
             <a:r>
               <a:rPr lang="en-DE" dirty="0"/>
-              <a:t>N, Resolution and Radius are made </a:t>
-            </a:r>
-            <a:r>
-              <a:rPr lang="en-DE"/>
-              <a:t>mutually exclusive.</a:t>
-            </a:r>
-            <a:endParaRPr lang="en-DE" dirty="0"/>
+              <a:t>N, Resolution and Radius are made mutually exclusive.</a:t>
+            </a:r>
           </a:p>
           <a:p>
             <a:r>
@@ -3809,26 +3815,9 @@
             </a:r>
           </a:p>
           <a:p>
-            <a:r>
-              <a:rPr lang="en-DE" dirty="0"/>
-              <a:t>User has the option to update the value of either N, Radius or Resolution from the console, if user enters yes then the given configuration is updated and distinct encoding is outputted. If user enter no on t</a:t>
-            </a:r>
-            <a:r>
-              <a:rPr lang="en-GB" dirty="0"/>
-              <a:t>he</a:t>
-            </a:r>
-            <a:r>
-              <a:rPr lang="en-DE" dirty="0"/>
-              <a:t> console, no values are updated and argument exception is thrown.</a:t>
-            </a:r>
-          </a:p>
-          <a:p>
-            <a:r>
-              <a:rPr lang="en-DE" dirty="0"/>
-              <a:t>Encoding could be done by calling from the command line.</a:t>
-            </a:r>
-          </a:p>
-          <a:p>
+            <a:pPr marL="0" indent="0">
+              <a:buNone/>
+            </a:pPr>
             <a:endParaRPr lang="en-DE" dirty="0"/>
           </a:p>
         </p:txBody>
@@ -3868,6 +3857,115 @@
           <p:cNvPr id="2" name="Title 1">
             <a:extLst>
               <a:ext uri="{FF2B5EF4-FFF2-40B4-BE49-F238E27FC236}">
+                <a16:creationId xmlns:a16="http://schemas.microsoft.com/office/drawing/2014/main" id="{53165268-7271-3B43-B2B4-9C528E909E2C}"/>
+              </a:ext>
+            </a:extLst>
+          </p:cNvPr>
+          <p:cNvSpPr>
+            <a:spLocks noGrp="1"/>
+          </p:cNvSpPr>
+          <p:nvPr>
+            <p:ph type="title"/>
+          </p:nvPr>
+        </p:nvSpPr>
+        <p:spPr/>
+        <p:txBody>
+          <a:bodyPr/>
+          <a:lstStyle/>
+          <a:p>
+            <a:r>
+              <a:rPr lang="en-DE" dirty="0"/>
+              <a:t>Improvement and features in the newer version of Scalar Encoder…</a:t>
+            </a:r>
+          </a:p>
+        </p:txBody>
+      </p:sp>
+      <p:sp>
+        <p:nvSpPr>
+          <p:cNvPr id="3" name="Content Placeholder 2">
+            <a:extLst>
+              <a:ext uri="{FF2B5EF4-FFF2-40B4-BE49-F238E27FC236}">
+                <a16:creationId xmlns:a16="http://schemas.microsoft.com/office/drawing/2014/main" id="{E17ADD46-900F-9E43-9B4C-2A925D006A57}"/>
+              </a:ext>
+            </a:extLst>
+          </p:cNvPr>
+          <p:cNvSpPr>
+            <a:spLocks noGrp="1"/>
+          </p:cNvSpPr>
+          <p:nvPr>
+            <p:ph idx="1"/>
+          </p:nvPr>
+        </p:nvSpPr>
+        <p:spPr/>
+        <p:txBody>
+          <a:bodyPr/>
+          <a:lstStyle/>
+          <a:p>
+            <a:r>
+              <a:rPr lang="en-DE" dirty="0"/>
+              <a:t>User has the option to update the value of either N, Radius or Resolution from the console, if user enters yes then the given configuration is updated and distinct encoding is outputted. If user enter no on t</a:t>
+            </a:r>
+            <a:r>
+              <a:rPr lang="en-GB" dirty="0"/>
+              <a:t>he</a:t>
+            </a:r>
+            <a:r>
+              <a:rPr lang="en-DE" dirty="0"/>
+              <a:t> console, no values are updated and argument exception is thrown.</a:t>
+            </a:r>
+          </a:p>
+          <a:p>
+            <a:r>
+              <a:rPr lang="en-DE" dirty="0"/>
+              <a:t>Encoding could be done by calling from the command line.</a:t>
+            </a:r>
+          </a:p>
+          <a:p>
+            <a:r>
+              <a:rPr lang="en-DE" dirty="0"/>
+              <a:t>Proper Unit Testing had been implemented that compares the older version with the improved version provided similar encodings.</a:t>
+            </a:r>
+          </a:p>
+          <a:p>
+            <a:endParaRPr lang="en-DE" dirty="0"/>
+          </a:p>
+        </p:txBody>
+      </p:sp>
+    </p:spTree>
+    <p:extLst>
+      <p:ext uri="{BB962C8B-B14F-4D97-AF65-F5344CB8AC3E}">
+        <p14:creationId xmlns:p14="http://schemas.microsoft.com/office/powerpoint/2010/main" val="759885625"/>
+      </p:ext>
+    </p:extLst>
+  </p:cSld>
+  <p:clrMapOvr>
+    <a:masterClrMapping/>
+  </p:clrMapOvr>
+</p:sld>
+</file>
+
+<file path=ppt/slides/slide6.xml><?xml version="1.0" encoding="utf-8"?>
+<p:sld xmlns:a="http://schemas.openxmlformats.org/drawingml/2006/main" xmlns:r="http://schemas.openxmlformats.org/officeDocument/2006/relationships" xmlns:p="http://schemas.openxmlformats.org/presentationml/2006/main">
+  <p:cSld>
+    <p:spTree>
+      <p:nvGrpSpPr>
+        <p:cNvPr id="1" name=""/>
+        <p:cNvGrpSpPr/>
+        <p:nvPr/>
+      </p:nvGrpSpPr>
+      <p:grpSpPr>
+        <a:xfrm>
+          <a:off x="0" y="0"/>
+          <a:ext cx="0" cy="0"/>
+          <a:chOff x="0" y="0"/>
+          <a:chExt cx="0" cy="0"/>
+        </a:xfrm>
+      </p:grpSpPr>
+      <p:sp>
+        <p:nvSpPr>
+          <p:cNvPr id="2" name="Title 1">
+            <a:extLst>
+              <a:ext uri="{FF2B5EF4-FFF2-40B4-BE49-F238E27FC236}">
                 <a16:creationId xmlns:a16="http://schemas.microsoft.com/office/drawing/2014/main" id="{CB240B4B-68E0-E540-8545-495B99F0CF04}"/>
               </a:ext>
             </a:extLst>
@@ -3882,16 +3980,28 @@
         <p:spPr>
           <a:xfrm>
             <a:off x="4001814" y="2103437"/>
-            <a:ext cx="3481552" cy="1325563"/>
+            <a:ext cx="4480034" cy="1659266"/>
           </a:xfrm>
         </p:spPr>
         <p:txBody>
-          <a:bodyPr/>
+          <a:bodyPr>
+            <a:normAutofit fontScale="90000"/>
+          </a:bodyPr>
           <a:lstStyle/>
           <a:p>
             <a:r>
               <a:rPr lang="en-DE" dirty="0"/>
               <a:t>Thank you!</a:t>
+            </a:r>
+            <a:br>
+              <a:rPr lang="en-DE" dirty="0"/>
+            </a:br>
+            <a:br>
+              <a:rPr lang="en-DE" dirty="0"/>
+            </a:br>
+            <a:r>
+              <a:rPr lang="en-DE" dirty="0"/>
+              <a:t>Auf Wiedersehen!</a:t>
             </a:r>
           </a:p>
         </p:txBody>

</xml_diff>

<commit_message>
minor update in presentation file
</commit_message>
<xml_diff>
--- a/source/ScalarEncoderImproved/Documentation/Improve Scalar Encoder Presentation.pptx
+++ b/source/ScalarEncoderImproved/Documentation/Improve Scalar Encoder Presentation.pptx
@@ -3560,14 +3560,18 @@
             </a:r>
             <a:r>
               <a:rPr lang="en-GB" dirty="0"/>
-              <a:t>is in the form of SDR representation, which is generated by Scalar Encoder.</a:t>
+              <a:t>is in the form of SDR representation, which is generated by Encoder.</a:t>
             </a:r>
             <a:endParaRPr lang="en-DE" dirty="0"/>
           </a:p>
           <a:p>
             <a:r>
+              <a:rPr lang="en-DE"/>
+              <a:t>Scalar Encoder Encodes </a:t>
+            </a:r>
+            <a:r>
               <a:rPr lang="en-DE" dirty="0"/>
-              <a:t>Encodes integer or floating point number to the SDRs representations in 0’s and 1’s.</a:t>
+              <a:t>integer or floating point number to the SDRs representations in 0’s and 1’s.</a:t>
             </a:r>
           </a:p>
           <a:p>

</xml_diff>

<commit_message>
minor change in slide - 2
</commit_message>
<xml_diff>
--- a/source/ScalarEncoderImproved/Documentation/Improve Scalar Encoder Presentation.pptx
+++ b/source/ScalarEncoderImproved/Documentation/Improve Scalar Encoder Presentation.pptx
@@ -3566,12 +3566,8 @@
           </a:p>
           <a:p>
             <a:r>
-              <a:rPr lang="en-DE"/>
-              <a:t>Scalar Encoder Encodes </a:t>
-            </a:r>
-            <a:r>
               <a:rPr lang="en-DE" dirty="0"/>
-              <a:t>integer or floating point number to the SDRs representations in 0’s and 1’s.</a:t>
+              <a:t>Scalar Encoder Encodes integer or floating point number to the SDRs representations in 0’s and 1’s.</a:t>
             </a:r>
           </a:p>
           <a:p>
@@ -3927,8 +3923,13 @@
           <a:p>
             <a:r>
               <a:rPr lang="en-DE" dirty="0"/>
-              <a:t>Proper Unit Testing had been implemented that compares the older version with the improved version provided similar encodings.</a:t>
-            </a:r>
+              <a:t>Proper Unit Testing had been implemented that compares the older version with the improved version provided </a:t>
+            </a:r>
+            <a:r>
+              <a:rPr lang="en-DE"/>
+              <a:t>similar configurations.</a:t>
+            </a:r>
+            <a:endParaRPr lang="en-DE" dirty="0"/>
           </a:p>
           <a:p>
             <a:endParaRPr lang="en-DE" dirty="0"/>

</xml_diff>

<commit_message>
minor change in presentation file
</commit_message>
<xml_diff>
--- a/source/ScalarEncoderImproved/Documentation/Improve Scalar Encoder Presentation.pptx
+++ b/source/ScalarEncoderImproved/Documentation/Improve Scalar Encoder Presentation.pptx
@@ -3440,8 +3440,13 @@
             <a:pPr algn="r"/>
             <a:r>
               <a:rPr lang="en-DE" dirty="0"/>
-              <a:t>Team : RAVEN</a:t>
-            </a:r>
+              <a:t>Team </a:t>
+            </a:r>
+            <a:r>
+              <a:rPr lang="en-DE"/>
+              <a:t>: RAVEN (WS 2021)</a:t>
+            </a:r>
+            <a:endParaRPr lang="en-DE" dirty="0"/>
           </a:p>
         </p:txBody>
       </p:sp>
@@ -3923,13 +3928,8 @@
           <a:p>
             <a:r>
               <a:rPr lang="en-DE" dirty="0"/>
-              <a:t>Proper Unit Testing had been implemented that compares the older version with the improved version provided </a:t>
-            </a:r>
-            <a:r>
-              <a:rPr lang="en-DE"/>
-              <a:t>similar configurations.</a:t>
-            </a:r>
-            <a:endParaRPr lang="en-DE" dirty="0"/>
+              <a:t>Proper Unit Testing had been implemented that compares the older version with the improved version provided similar configurations.</a:t>
+            </a:r>
           </a:p>
           <a:p>
             <a:endParaRPr lang="en-DE" dirty="0"/>

</xml_diff>